<commit_message>
update README, slide and add report
</commit_message>
<xml_diff>
--- a/CIFAR-10-Image-Classification.pptx
+++ b/CIFAR-10-Image-Classification.pptx
@@ -6170,7 +6170,7 @@
           <a:p>
             <a:fld id="{02AC24A9-CCB6-4F8D-B8DB-C2F3692CFA5A}" type="datetimeFigureOut">
               <a:rPr lang="en-US" smtClean="0"/>
-              <a:t>12/18/2019</a:t>
+              <a:t>12/20/2019</a:t>
             </a:fld>
             <a:endParaRPr lang="en-US" dirty="0"/>
           </a:p>
@@ -6540,7 +6540,7 @@
           <a:p>
             <a:fld id="{02AC24A9-CCB6-4F8D-B8DB-C2F3692CFA5A}" type="datetimeFigureOut">
               <a:rPr lang="en-US" smtClean="0"/>
-              <a:t>12/18/2019</a:t>
+              <a:t>12/20/2019</a:t>
             </a:fld>
             <a:endParaRPr lang="en-US"/>
           </a:p>
@@ -6749,7 +6749,7 @@
           <a:p>
             <a:fld id="{02AC24A9-CCB6-4F8D-B8DB-C2F3692CFA5A}" type="datetimeFigureOut">
               <a:rPr lang="en-US" smtClean="0"/>
-              <a:t>12/18/2019</a:t>
+              <a:t>12/20/2019</a:t>
             </a:fld>
             <a:endParaRPr lang="en-US"/>
           </a:p>
@@ -7219,7 +7219,7 @@
           <a:p>
             <a:fld id="{02AC24A9-CCB6-4F8D-B8DB-C2F3692CFA5A}" type="datetimeFigureOut">
               <a:rPr lang="en-US" smtClean="0"/>
-              <a:t>12/18/2019</a:t>
+              <a:t>12/20/2019</a:t>
             </a:fld>
             <a:endParaRPr lang="en-US"/>
           </a:p>
@@ -7673,7 +7673,7 @@
           <a:p>
             <a:fld id="{02AC24A9-CCB6-4F8D-B8DB-C2F3692CFA5A}" type="datetimeFigureOut">
               <a:rPr lang="en-US" smtClean="0"/>
-              <a:t>12/18/2019</a:t>
+              <a:t>12/20/2019</a:t>
             </a:fld>
             <a:endParaRPr lang="en-US"/>
           </a:p>
@@ -8205,7 +8205,7 @@
           <a:p>
             <a:fld id="{02AC24A9-CCB6-4F8D-B8DB-C2F3692CFA5A}" type="datetimeFigureOut">
               <a:rPr lang="en-US" smtClean="0"/>
-              <a:t>12/18/2019</a:t>
+              <a:t>12/20/2019</a:t>
             </a:fld>
             <a:endParaRPr lang="en-US"/>
           </a:p>
@@ -8904,7 +8904,7 @@
           <a:p>
             <a:fld id="{02AC24A9-CCB6-4F8D-B8DB-C2F3692CFA5A}" type="datetimeFigureOut">
               <a:rPr lang="en-US" smtClean="0"/>
-              <a:t>12/18/2019</a:t>
+              <a:t>12/20/2019</a:t>
             </a:fld>
             <a:endParaRPr lang="en-US"/>
           </a:p>
@@ -9233,7 +9233,7 @@
           <a:p>
             <a:fld id="{02AC24A9-CCB6-4F8D-B8DB-C2F3692CFA5A}" type="datetimeFigureOut">
               <a:rPr lang="en-US" smtClean="0"/>
-              <a:t>12/18/2019</a:t>
+              <a:t>12/20/2019</a:t>
             </a:fld>
             <a:endParaRPr lang="en-US"/>
           </a:p>
@@ -9346,7 +9346,7 @@
           <a:p>
             <a:fld id="{02AC24A9-CCB6-4F8D-B8DB-C2F3692CFA5A}" type="datetimeFigureOut">
               <a:rPr lang="en-US" smtClean="0"/>
-              <a:t>12/18/2019</a:t>
+              <a:t>12/20/2019</a:t>
             </a:fld>
             <a:endParaRPr lang="en-US"/>
           </a:p>
@@ -9841,7 +9841,7 @@
           <a:p>
             <a:fld id="{02AC24A9-CCB6-4F8D-B8DB-C2F3692CFA5A}" type="datetimeFigureOut">
               <a:rPr lang="en-US" smtClean="0"/>
-              <a:t>12/18/2019</a:t>
+              <a:t>12/20/2019</a:t>
             </a:fld>
             <a:endParaRPr lang="en-US" dirty="0"/>
           </a:p>
@@ -10318,7 +10318,7 @@
           <a:p>
             <a:fld id="{02AC24A9-CCB6-4F8D-B8DB-C2F3692CFA5A}" type="datetimeFigureOut">
               <a:rPr lang="en-US" smtClean="0"/>
-              <a:t>12/18/2019</a:t>
+              <a:t>12/20/2019</a:t>
             </a:fld>
             <a:endParaRPr lang="en-US"/>
           </a:p>
@@ -10561,7 +10561,7 @@
           <a:p>
             <a:fld id="{02AC24A9-CCB6-4F8D-B8DB-C2F3692CFA5A}" type="datetimeFigureOut">
               <a:rPr lang="en-US" smtClean="0"/>
-              <a:t>12/18/2019</a:t>
+              <a:t>12/20/2019</a:t>
             </a:fld>
             <a:endParaRPr lang="en-US"/>
           </a:p>
@@ -19528,36 +19528,6 @@
           </a:p>
         </p:txBody>
       </p:sp>
-      <p:pic>
-        <p:nvPicPr>
-          <p:cNvPr id="4" name="Picture 3">
-            <a:extLst>
-              <a:ext uri="{FF2B5EF4-FFF2-40B4-BE49-F238E27FC236}">
-                <a16:creationId xmlns:a16="http://schemas.microsoft.com/office/drawing/2014/main" id="{4B55FD76-9637-45FC-9937-A1C93B1AFE9B}"/>
-              </a:ext>
-            </a:extLst>
-          </p:cNvPr>
-          <p:cNvPicPr>
-            <a:picLocks noChangeAspect="1"/>
-          </p:cNvPicPr>
-          <p:nvPr/>
-        </p:nvPicPr>
-        <p:blipFill>
-          <a:blip r:embed="rId2"/>
-          <a:stretch>
-            <a:fillRect/>
-          </a:stretch>
-        </p:blipFill>
-        <p:spPr>
-          <a:xfrm>
-            <a:off x="6376280" y="2485294"/>
-            <a:ext cx="5240656" cy="3424615"/>
-          </a:xfrm>
-          <a:prstGeom prst="rect">
-            <a:avLst/>
-          </a:prstGeom>
-        </p:spPr>
-      </p:pic>
       <mc:AlternateContent xmlns:mc="http://schemas.openxmlformats.org/markup-compatibility/2006">
         <mc:Choice xmlns:a14="http://schemas.microsoft.com/office/drawing/2010/main" Requires="a14">
           <p:sp>
@@ -19574,8 +19544,8 @@
             </p:nvSpPr>
             <p:spPr>
               <a:xfrm>
-                <a:off x="681493" y="4068566"/>
-                <a:ext cx="5013295" cy="598818"/>
+                <a:off x="1282740" y="5389335"/>
+                <a:ext cx="8967904" cy="532518"/>
               </a:xfrm>
               <a:prstGeom prst="rect">
                 <a:avLst/>
@@ -19595,63 +19565,54 @@
                 <a14:m>
                   <m:oMath xmlns:m="http://schemas.openxmlformats.org/officeDocument/2006/math">
                     <m:r>
-                      <a:rPr lang="en-US" i="1" smtClean="0"/>
+                      <a:rPr lang="en-US" i="1"/>
                       <m:t>=</m:t>
                     </m:r>
                     <m:f>
                       <m:fPr>
                         <m:ctrlPr>
-                          <a:rPr lang="en-US" i="1" smtClean="0"/>
+                          <a:rPr lang="en-US" i="1"/>
                         </m:ctrlPr>
                       </m:fPr>
                       <m:num>
                         <m:r>
                           <m:rPr>
-                            <m:nor/>
+                            <m:sty m:val="p"/>
                           </m:rPr>
-                          <a:rPr lang="en-US" dirty="0"/>
+                          <a:rPr lang="en-US"/>
                           <m:t>number</m:t>
                         </m:r>
                         <m:r>
-                          <m:rPr>
-                            <m:nor/>
-                          </m:rPr>
-                          <a:rPr lang="en-US" dirty="0"/>
+                          <a:rPr lang="en-US"/>
                           <m:t> </m:t>
                         </m:r>
                         <m:r>
                           <m:rPr>
-                            <m:nor/>
+                            <m:sty m:val="p"/>
                           </m:rPr>
-                          <a:rPr lang="en-US" dirty="0"/>
+                          <a:rPr lang="en-US"/>
                           <m:t>of</m:t>
                         </m:r>
                         <m:r>
-                          <m:rPr>
-                            <m:nor/>
-                          </m:rPr>
-                          <a:rPr lang="en-US" dirty="0"/>
+                          <a:rPr lang="en-US"/>
                           <m:t> </m:t>
                         </m:r>
                         <m:r>
                           <m:rPr>
-                            <m:nor/>
+                            <m:sty m:val="p"/>
                           </m:rPr>
-                          <a:rPr lang="en-US" dirty="0"/>
+                          <a:rPr lang="en-US"/>
                           <m:t>corrected</m:t>
                         </m:r>
                         <m:r>
-                          <m:rPr>
-                            <m:nor/>
-                          </m:rPr>
-                          <a:rPr lang="en-US" dirty="0"/>
+                          <a:rPr lang="en-US"/>
                           <m:t> </m:t>
                         </m:r>
                         <m:r>
                           <m:rPr>
-                            <m:nor/>
+                            <m:sty m:val="p"/>
                           </m:rPr>
-                          <a:rPr lang="en-US" dirty="0"/>
+                          <a:rPr lang="en-US"/>
                           <m:t>predictions</m:t>
                         </m:r>
                       </m:num>
@@ -19660,47 +19621,77 @@
                           <m:rPr>
                             <m:sty m:val="p"/>
                           </m:rPr>
-                          <a:rPr lang="en-US" b="0" i="0" smtClean="0"/>
+                          <a:rPr lang="en-US"/>
                           <m:t>total</m:t>
                         </m:r>
                         <m:r>
-                          <a:rPr lang="en-US" b="0" i="0" smtClean="0"/>
+                          <a:rPr lang="en-US" i="1"/>
                           <m:t> </m:t>
                         </m:r>
                         <m:r>
                           <m:rPr>
                             <m:sty m:val="p"/>
                           </m:rPr>
-                          <a:rPr lang="en-US" b="0" i="0" smtClean="0"/>
+                          <a:rPr lang="en-US"/>
                           <m:t>number</m:t>
                         </m:r>
                         <m:r>
-                          <a:rPr lang="en-US" b="0" i="0" smtClean="0"/>
+                          <a:rPr lang="en-US" i="1"/>
                           <m:t> </m:t>
                         </m:r>
                         <m:r>
                           <m:rPr>
                             <m:sty m:val="p"/>
                           </m:rPr>
-                          <a:rPr lang="en-US" b="0" i="0" smtClean="0"/>
+                          <a:rPr lang="en-US"/>
                           <m:t>of</m:t>
                         </m:r>
                         <m:r>
-                          <a:rPr lang="en-US" b="0" i="0" smtClean="0"/>
+                          <a:rPr lang="en-US" i="1"/>
                           <m:t> </m:t>
                         </m:r>
                         <m:r>
                           <m:rPr>
                             <m:sty m:val="p"/>
                           </m:rPr>
-                          <a:rPr lang="en-US" b="0" i="0" smtClean="0"/>
+                          <a:rPr lang="en-US"/>
                           <m:t>predictions</m:t>
                         </m:r>
                       </m:den>
                     </m:f>
                   </m:oMath>
                 </a14:m>
-                <a:endParaRPr lang="en-US" dirty="0"/>
+                <a:r>
+                  <a:rPr lang="en-US" dirty="0"/>
+                  <a:t> = </a:t>
+                </a:r>
+                <a14:m>
+                  <m:oMath xmlns:m="http://schemas.openxmlformats.org/officeDocument/2006/math">
+                    <m:f>
+                      <m:fPr>
+                        <m:ctrlPr>
+                          <a:rPr lang="en-US" i="1"/>
+                        </m:ctrlPr>
+                      </m:fPr>
+                      <m:num>
+                        <m:r>
+                          <a:rPr lang="en-US"/>
+                          <m:t>880+947+656+619+775+777+959+882+878+912</m:t>
+                        </m:r>
+                      </m:num>
+                      <m:den>
+                        <m:r>
+                          <a:rPr lang="en-US"/>
+                          <m:t>10000</m:t>
+                        </m:r>
+                      </m:den>
+                    </m:f>
+                  </m:oMath>
+                </a14:m>
+                <a:r>
+                  <a:rPr lang="en-US" dirty="0"/>
+                  <a:t> = 0.8285</a:t>
+                </a:r>
               </a:p>
             </p:txBody>
           </p:sp>
@@ -19722,16 +19713,16 @@
             </p:nvSpPr>
             <p:spPr>
               <a:xfrm>
-                <a:off x="681493" y="4068566"/>
-                <a:ext cx="5013295" cy="598818"/>
+                <a:off x="1282740" y="5389335"/>
+                <a:ext cx="8967904" cy="532518"/>
               </a:xfrm>
               <a:prstGeom prst="rect">
                 <a:avLst/>
               </a:prstGeom>
               <a:blipFill>
-                <a:blip r:embed="rId3"/>
+                <a:blip r:embed="rId2"/>
                 <a:stretch>
-                  <a:fillRect l="-1095"/>
+                  <a:fillRect l="-543" b="-6897"/>
                 </a:stretch>
               </a:blipFill>
             </p:spPr>
@@ -19750,6 +19741,36 @@
           </p:sp>
         </mc:Fallback>
       </mc:AlternateContent>
+      <p:pic>
+        <p:nvPicPr>
+          <p:cNvPr id="7" name="Picture 6">
+            <a:extLst>
+              <a:ext uri="{FF2B5EF4-FFF2-40B4-BE49-F238E27FC236}">
+                <a16:creationId xmlns:a16="http://schemas.microsoft.com/office/drawing/2014/main" id="{1D3CAD93-539C-4F37-A70E-010A9368C3E7}"/>
+              </a:ext>
+            </a:extLst>
+          </p:cNvPr>
+          <p:cNvPicPr>
+            <a:picLocks noChangeAspect="1"/>
+          </p:cNvPicPr>
+          <p:nvPr/>
+        </p:nvPicPr>
+        <p:blipFill>
+          <a:blip r:embed="rId3"/>
+          <a:stretch>
+            <a:fillRect/>
+          </a:stretch>
+        </p:blipFill>
+        <p:spPr>
+          <a:xfrm>
+            <a:off x="2357437" y="2076450"/>
+            <a:ext cx="7477125" cy="2705100"/>
+          </a:xfrm>
+          <a:prstGeom prst="rect">
+            <a:avLst/>
+          </a:prstGeom>
+        </p:spPr>
+      </p:pic>
     </p:spTree>
     <p:extLst>
       <p:ext uri="{BB962C8B-B14F-4D97-AF65-F5344CB8AC3E}">
@@ -19913,6 +19934,19 @@
                 <a:r>
                   <a:rPr lang="en-US" dirty="0"/>
                   <a:t>: predicted output value</a:t>
+                </a:r>
+              </a:p>
+              <a:p>
+                <a:pPr marL="0" indent="0">
+                  <a:buNone/>
+                </a:pPr>
+                <a:r>
+                  <a:rPr lang="en-US" dirty="0"/>
+                  <a:t>Multiple predictions: </a:t>
+                </a:r>
+                <a:r>
+                  <a:rPr lang="en-US" sz="1800" dirty="0"/>
+                  <a:t>Final CE Loss = average of all CE loss of each prediction</a:t>
                 </a:r>
               </a:p>
             </p:txBody>

</xml_diff>